<commit_message>
Add an older problem
</commit_message>
<xml_diff>
--- a/2023/2023-03/2023-03-17/problem.pptx
+++ b/2023/2023-03/2023-03-17/problem.pptx
@@ -5923,7 +5923,15 @@
           <a:p>
             <a:r>
               <a:rPr lang="en-US" dirty="0"/>
-              <a:t>Given 4 match sticks can for a square like the image below.  Use 12 match sticks to create 6 squares of the same size as the one shown.</a:t>
+              <a:t>Given 4 match sticks </a:t>
+            </a:r>
+            <a:r>
+              <a:rPr lang="en-US"/>
+              <a:t>can create </a:t>
+            </a:r>
+            <a:r>
+              <a:rPr lang="en-US" dirty="0"/>
+              <a:t>a square like the image below.  Use 12 match sticks to create 6 squares of the same size as the one shown.</a:t>
             </a:r>
           </a:p>
         </p:txBody>

</xml_diff>